<commit_message>
Add WP 490 - Stress Relief work procedure
</commit_message>
<xml_diff>
--- a/Cad Plating.pptx
+++ b/Cad Plating.pptx
@@ -4658,8 +4658,13 @@
             </a:pPr>
             <a:r>
               <a:rPr lang="en-US" dirty="0"/>
-              <a:t>Embrittlement Relief within 4 hours after plating (23 hours minimum baked)</a:t>
-            </a:r>
+              <a:t>Embrittlement Relief within 4 hours after plating (23 hours minimum </a:t>
+            </a:r>
+            <a:r>
+              <a:rPr lang="en-US"/>
+              <a:t>baked) (WP 490)</a:t>
+            </a:r>
+            <a:endParaRPr lang="en-US" dirty="0"/>
           </a:p>
           <a:p>
             <a:pPr marL="514350" indent="-514350">

</xml_diff>

<commit_message>
add pyrometry and training revision
</commit_message>
<xml_diff>
--- a/Cad Plating.pptx
+++ b/Cad Plating.pptx
@@ -29,6 +29,8 @@
     <p:sldId id="276" r:id="rId23"/>
     <p:sldId id="278" r:id="rId24"/>
     <p:sldId id="279" r:id="rId25"/>
+    <p:sldId id="280" r:id="rId26"/>
+    <p:sldId id="281" r:id="rId27"/>
   </p:sldIdLst>
   <p:sldSz cx="9144000" cy="6858000" type="screen4x3"/>
   <p:notesSz cx="6858000" cy="9144000"/>
@@ -3091,9 +3093,10 @@
           <a:lstStyle/>
           <a:p>
             <a:r>
-              <a:rPr lang="en-US" dirty="0"/>
-              <a:t>6/2020</a:t>
-            </a:r>
+              <a:rPr lang="en-US"/>
+              <a:t>4/2022 Rev A</a:t>
+            </a:r>
+            <a:endParaRPr lang="en-US" dirty="0"/>
           </a:p>
         </p:txBody>
       </p:sp>
@@ -5105,7 +5108,7 @@
           <a:p>
             <a:r>
               <a:rPr lang="en-US" dirty="0"/>
-              <a:t>Pyrometry – AMS 2750</a:t>
+              <a:t>Pyrometry – AMS 2750 (WP 459)</a:t>
             </a:r>
           </a:p>
         </p:txBody>
@@ -5212,6 +5215,366 @@
     <p:extLst>
       <p:ext uri="{BB962C8B-B14F-4D97-AF65-F5344CB8AC3E}">
         <p14:creationId xmlns:p14="http://schemas.microsoft.com/office/powerpoint/2010/main" val="3915738193"/>
+      </p:ext>
+    </p:extLst>
+  </p:cSld>
+  <p:clrMapOvr>
+    <a:masterClrMapping/>
+  </p:clrMapOvr>
+</p:sld>
+</file>
+
+<file path=ppt/slides/slide25.xml><?xml version="1.0" encoding="utf-8"?>
+<p:sld xmlns:a="http://schemas.openxmlformats.org/drawingml/2006/main" xmlns:r="http://schemas.openxmlformats.org/officeDocument/2006/relationships" xmlns:p="http://schemas.openxmlformats.org/presentationml/2006/main">
+  <p:cSld>
+    <p:spTree>
+      <p:nvGrpSpPr>
+        <p:cNvPr id="1" name=""/>
+        <p:cNvGrpSpPr/>
+        <p:nvPr/>
+      </p:nvGrpSpPr>
+      <p:grpSpPr>
+        <a:xfrm>
+          <a:off x="0" y="0"/>
+          <a:ext cx="0" cy="0"/>
+          <a:chOff x="0" y="0"/>
+          <a:chExt cx="0" cy="0"/>
+        </a:xfrm>
+      </p:grpSpPr>
+      <p:sp>
+        <p:nvSpPr>
+          <p:cNvPr id="2" name="Title 1">
+            <a:extLst>
+              <a:ext uri="{FF2B5EF4-FFF2-40B4-BE49-F238E27FC236}">
+                <a16:creationId xmlns:a16="http://schemas.microsoft.com/office/drawing/2014/main" id="{E77C37DE-A9E4-8A04-958E-980DF7B6ED01}"/>
+              </a:ext>
+            </a:extLst>
+          </p:cNvPr>
+          <p:cNvSpPr>
+            <a:spLocks noGrp="1"/>
+          </p:cNvSpPr>
+          <p:nvPr>
+            <p:ph type="title"/>
+          </p:nvPr>
+        </p:nvSpPr>
+        <p:spPr/>
+        <p:txBody>
+          <a:bodyPr/>
+          <a:lstStyle/>
+          <a:p>
+            <a:r>
+              <a:rPr lang="en-US" dirty="0"/>
+              <a:t>Stress</a:t>
+            </a:r>
+            <a:r>
+              <a:rPr lang="en-US" baseline="0" dirty="0"/>
+              <a:t> Relief Record (WP 490)</a:t>
+            </a:r>
+            <a:endParaRPr lang="en-US" dirty="0"/>
+          </a:p>
+        </p:txBody>
+      </p:sp>
+      <p:sp>
+        <p:nvSpPr>
+          <p:cNvPr id="3" name="Content Placeholder 2">
+            <a:extLst>
+              <a:ext uri="{FF2B5EF4-FFF2-40B4-BE49-F238E27FC236}">
+                <a16:creationId xmlns:a16="http://schemas.microsoft.com/office/drawing/2014/main" id="{AC1C4942-2831-7031-49D2-A49C497A3121}"/>
+              </a:ext>
+            </a:extLst>
+          </p:cNvPr>
+          <p:cNvSpPr>
+            <a:spLocks noGrp="1"/>
+          </p:cNvSpPr>
+          <p:nvPr>
+            <p:ph idx="1"/>
+          </p:nvPr>
+        </p:nvSpPr>
+        <p:spPr/>
+        <p:txBody>
+          <a:bodyPr/>
+          <a:lstStyle/>
+          <a:p>
+            <a:r>
+              <a:rPr lang="en-US" sz="3200" kern="1200" dirty="0">
+                <a:solidFill>
+                  <a:schemeClr val="tx1"/>
+                </a:solidFill>
+                <a:effectLst/>
+                <a:latin typeface="+mn-lt"/>
+                <a:ea typeface="+mn-ea"/>
+                <a:cs typeface="+mn-cs"/>
+              </a:rPr>
+              <a:t>Date and time of completion of the plating </a:t>
+            </a:r>
+          </a:p>
+          <a:p>
+            <a:pPr marL="342900" marR="0" lvl="0" indent="-342900" algn="l" defTabSz="914400" rtl="0" eaLnBrk="1" fontAlgn="auto" latinLnBrk="0" hangingPunct="1">
+              <a:lnSpc>
+                <a:spcPct val="100000"/>
+              </a:lnSpc>
+              <a:spcBef>
+                <a:spcPct val="20000"/>
+              </a:spcBef>
+              <a:spcAft>
+                <a:spcPts val="0"/>
+              </a:spcAft>
+              <a:buClrTx/>
+              <a:buSzTx/>
+              <a:buFont typeface="Arial" pitchFamily="34" charset="0"/>
+              <a:buChar char="•"/>
+              <a:tabLst/>
+              <a:defRPr/>
+            </a:pPr>
+            <a:r>
+              <a:rPr lang="en-US" sz="3200" kern="1200" dirty="0">
+                <a:solidFill>
+                  <a:schemeClr val="tx1"/>
+                </a:solidFill>
+                <a:effectLst/>
+                <a:latin typeface="+mn-lt"/>
+                <a:ea typeface="+mn-ea"/>
+                <a:cs typeface="+mn-cs"/>
+              </a:rPr>
+              <a:t>Date and time of start of baking</a:t>
+            </a:r>
+          </a:p>
+          <a:p>
+            <a:pPr marL="342900" marR="0" lvl="0" indent="-342900" algn="l" defTabSz="914400" rtl="0" eaLnBrk="1" fontAlgn="auto" latinLnBrk="0" hangingPunct="1">
+              <a:lnSpc>
+                <a:spcPct val="100000"/>
+              </a:lnSpc>
+              <a:spcBef>
+                <a:spcPct val="20000"/>
+              </a:spcBef>
+              <a:spcAft>
+                <a:spcPts val="0"/>
+              </a:spcAft>
+              <a:buClrTx/>
+              <a:buSzTx/>
+              <a:buFont typeface="Arial" pitchFamily="34" charset="0"/>
+              <a:buChar char="•"/>
+              <a:tabLst/>
+              <a:defRPr/>
+            </a:pPr>
+            <a:r>
+              <a:rPr lang="en-US" sz="3200" kern="1200" dirty="0">
+                <a:solidFill>
+                  <a:schemeClr val="tx1"/>
+                </a:solidFill>
+                <a:effectLst/>
+                <a:latin typeface="+mn-lt"/>
+                <a:ea typeface="+mn-ea"/>
+                <a:cs typeface="+mn-cs"/>
+              </a:rPr>
+              <a:t>Date and time of start of soak</a:t>
+            </a:r>
+          </a:p>
+          <a:p>
+            <a:pPr marL="342900" marR="0" lvl="0" indent="-342900" algn="l" defTabSz="914400" rtl="0" eaLnBrk="1" fontAlgn="auto" latinLnBrk="0" hangingPunct="1">
+              <a:lnSpc>
+                <a:spcPct val="100000"/>
+              </a:lnSpc>
+              <a:spcBef>
+                <a:spcPct val="20000"/>
+              </a:spcBef>
+              <a:spcAft>
+                <a:spcPts val="0"/>
+              </a:spcAft>
+              <a:buClrTx/>
+              <a:buSzTx/>
+              <a:buFont typeface="Arial" pitchFamily="34" charset="0"/>
+              <a:buChar char="•"/>
+              <a:tabLst/>
+              <a:defRPr/>
+            </a:pPr>
+            <a:r>
+              <a:rPr lang="en-US" sz="3200" kern="1200" dirty="0">
+                <a:solidFill>
+                  <a:schemeClr val="tx1"/>
+                </a:solidFill>
+                <a:effectLst/>
+                <a:latin typeface="+mn-lt"/>
+                <a:ea typeface="+mn-ea"/>
+                <a:cs typeface="+mn-cs"/>
+              </a:rPr>
+              <a:t>Date and time of completion of baking</a:t>
+            </a:r>
+          </a:p>
+          <a:p>
+            <a:pPr marL="342900" marR="0" lvl="0" indent="-342900" algn="l" defTabSz="914400" rtl="0" eaLnBrk="1" fontAlgn="auto" latinLnBrk="0" hangingPunct="1">
+              <a:lnSpc>
+                <a:spcPct val="100000"/>
+              </a:lnSpc>
+              <a:spcBef>
+                <a:spcPct val="20000"/>
+              </a:spcBef>
+              <a:spcAft>
+                <a:spcPts val="0"/>
+              </a:spcAft>
+              <a:buClrTx/>
+              <a:buSzTx/>
+              <a:buFont typeface="Arial" pitchFamily="34" charset="0"/>
+              <a:buChar char="•"/>
+              <a:tabLst/>
+              <a:defRPr/>
+            </a:pPr>
+            <a:r>
+              <a:rPr lang="en-US" sz="3200" kern="1200" dirty="0">
+                <a:solidFill>
+                  <a:schemeClr val="tx1"/>
+                </a:solidFill>
+                <a:effectLst/>
+                <a:latin typeface="+mn-lt"/>
+                <a:ea typeface="+mn-ea"/>
+                <a:cs typeface="+mn-cs"/>
+              </a:rPr>
+              <a:t>Furnace control instrument set temperature</a:t>
+            </a:r>
+          </a:p>
+          <a:p>
+            <a:pPr marL="342900" marR="0" lvl="0" indent="-342900" algn="l" defTabSz="914400" rtl="0" eaLnBrk="1" fontAlgn="auto" latinLnBrk="0" hangingPunct="1">
+              <a:lnSpc>
+                <a:spcPct val="100000"/>
+              </a:lnSpc>
+              <a:spcBef>
+                <a:spcPct val="20000"/>
+              </a:spcBef>
+              <a:spcAft>
+                <a:spcPts val="0"/>
+              </a:spcAft>
+              <a:buClrTx/>
+              <a:buSzTx/>
+              <a:buFont typeface="Arial" pitchFamily="34" charset="0"/>
+              <a:buChar char="•"/>
+              <a:tabLst/>
+              <a:defRPr/>
+            </a:pPr>
+            <a:r>
+              <a:rPr lang="en-US" sz="3200" kern="1200" dirty="0">
+                <a:solidFill>
+                  <a:schemeClr val="tx1"/>
+                </a:solidFill>
+                <a:effectLst/>
+                <a:latin typeface="+mn-lt"/>
+                <a:ea typeface="+mn-ea"/>
+                <a:cs typeface="+mn-cs"/>
+              </a:rPr>
+              <a:t>Furnace identification</a:t>
+            </a:r>
+          </a:p>
+        </p:txBody>
+      </p:sp>
+    </p:spTree>
+    <p:extLst>
+      <p:ext uri="{BB962C8B-B14F-4D97-AF65-F5344CB8AC3E}">
+        <p14:creationId xmlns:p14="http://schemas.microsoft.com/office/powerpoint/2010/main" val="2620820559"/>
+      </p:ext>
+    </p:extLst>
+  </p:cSld>
+  <p:clrMapOvr>
+    <a:masterClrMapping/>
+  </p:clrMapOvr>
+</p:sld>
+</file>
+
+<file path=ppt/slides/slide26.xml><?xml version="1.0" encoding="utf-8"?>
+<p:sld xmlns:a="http://schemas.openxmlformats.org/drawingml/2006/main" xmlns:r="http://schemas.openxmlformats.org/officeDocument/2006/relationships" xmlns:p="http://schemas.openxmlformats.org/presentationml/2006/main">
+  <p:cSld>
+    <p:spTree>
+      <p:nvGrpSpPr>
+        <p:cNvPr id="1" name=""/>
+        <p:cNvGrpSpPr/>
+        <p:nvPr/>
+      </p:nvGrpSpPr>
+      <p:grpSpPr>
+        <a:xfrm>
+          <a:off x="0" y="0"/>
+          <a:ext cx="0" cy="0"/>
+          <a:chOff x="0" y="0"/>
+          <a:chExt cx="0" cy="0"/>
+        </a:xfrm>
+      </p:grpSpPr>
+      <p:sp>
+        <p:nvSpPr>
+          <p:cNvPr id="2" name="Title 1">
+            <a:extLst>
+              <a:ext uri="{FF2B5EF4-FFF2-40B4-BE49-F238E27FC236}">
+                <a16:creationId xmlns:a16="http://schemas.microsoft.com/office/drawing/2014/main" id="{00D87973-5126-23A6-7789-AC27A9710E3D}"/>
+              </a:ext>
+            </a:extLst>
+          </p:cNvPr>
+          <p:cNvSpPr>
+            <a:spLocks noGrp="1"/>
+          </p:cNvSpPr>
+          <p:nvPr>
+            <p:ph type="title"/>
+          </p:nvPr>
+        </p:nvSpPr>
+        <p:spPr/>
+        <p:txBody>
+          <a:bodyPr/>
+          <a:lstStyle/>
+          <a:p>
+            <a:r>
+              <a:rPr lang="en-US" dirty="0"/>
+              <a:t>Recorder Charts (WP 459)</a:t>
+            </a:r>
+          </a:p>
+        </p:txBody>
+      </p:sp>
+      <p:sp>
+        <p:nvSpPr>
+          <p:cNvPr id="3" name="Content Placeholder 2">
+            <a:extLst>
+              <a:ext uri="{FF2B5EF4-FFF2-40B4-BE49-F238E27FC236}">
+                <a16:creationId xmlns:a16="http://schemas.microsoft.com/office/drawing/2014/main" id="{F3415F1E-9072-6A68-EE25-5D73A912F481}"/>
+              </a:ext>
+            </a:extLst>
+          </p:cNvPr>
+          <p:cNvSpPr>
+            <a:spLocks noGrp="1"/>
+          </p:cNvSpPr>
+          <p:nvPr>
+            <p:ph idx="1"/>
+          </p:nvPr>
+        </p:nvSpPr>
+        <p:spPr/>
+        <p:txBody>
+          <a:bodyPr/>
+          <a:lstStyle/>
+          <a:p>
+            <a:r>
+              <a:rPr lang="en-US" dirty="0"/>
+              <a:t>Records shall be traceable</a:t>
+            </a:r>
+            <a:r>
+              <a:rPr lang="en-US" baseline="0" dirty="0"/>
+              <a:t> to temperature recorder charts.</a:t>
+            </a:r>
+          </a:p>
+          <a:p>
+            <a:r>
+              <a:rPr lang="en-US" baseline="0" dirty="0"/>
+              <a:t>WP 459 Appendix A – Electronic Record</a:t>
+            </a:r>
+          </a:p>
+          <a:p>
+            <a:r>
+              <a:rPr lang="en-US" baseline="0" dirty="0"/>
+              <a:t>WP 459 Appendix B –</a:t>
+            </a:r>
+            <a:r>
+              <a:rPr lang="en-US" dirty="0"/>
+              <a:t> Electronic Chart Recorder Documentation</a:t>
+            </a:r>
+          </a:p>
+        </p:txBody>
+      </p:sp>
+    </p:spTree>
+    <p:extLst>
+      <p:ext uri="{BB962C8B-B14F-4D97-AF65-F5344CB8AC3E}">
+        <p14:creationId xmlns:p14="http://schemas.microsoft.com/office/powerpoint/2010/main" val="311151986"/>
       </p:ext>
     </p:extLst>
   </p:cSld>

</xml_diff>